<commit_message>
update(documentation): Update Documentation Pictures
</commit_message>
<xml_diff>
--- a/documentation/templates.pptx
+++ b/documentation/templates.pptx
@@ -110,6 +110,22 @@
       </a:defRPr>
     </a:lvl9pPr>
   </p:defaultTextStyle>
+  <p:extLst>
+    <p:ext uri="{EFAFB233-063F-42B5-8137-9DF3F51BA10A}">
+      <p15:sldGuideLst xmlns:p15="http://schemas.microsoft.com/office/powerpoint/2012/main">
+        <p15:guide id="1" orient="horz" pos="2160">
+          <p15:clr>
+            <a:srgbClr val="A4A3A4"/>
+          </p15:clr>
+        </p15:guide>
+        <p15:guide id="2" pos="2880">
+          <p15:clr>
+            <a:srgbClr val="A4A3A4"/>
+          </p15:clr>
+        </p15:guide>
+      </p15:sldGuideLst>
+    </p:ext>
+  </p:extLst>
 </p:presentation>
 </file>
 
@@ -195,7 +211,7 @@
           <a:p>
             <a:fld id="{880DDA9C-0615-479E-BED9-CFB4A9724083}" type="datetimeFigureOut">
               <a:rPr lang="en-US" smtClean="0"/>
-              <a:t>2/8/2019</a:t>
+              <a:t>2/9/2019</a:t>
             </a:fld>
             <a:endParaRPr lang="en-US"/>
           </a:p>
@@ -354,7 +370,7 @@
           <a:p>
             <a:fld id="{3E15F755-A83F-46D5-8F93-7520A23432D2}" type="slidenum">
               <a:rPr lang="en-US" smtClean="0"/>
-              <a:t>‹#›</a:t>
+              <a:t>‹N°›</a:t>
             </a:fld>
             <a:endParaRPr lang="en-US"/>
           </a:p>
@@ -981,7 +997,7 @@
             <a:fld id="{1D8BD707-D9CF-40AE-B4C6-C98DA3205C09}" type="datetimeFigureOut">
               <a:rPr lang="en-US" smtClean="0"/>
               <a:pPr/>
-              <a:t>2/8/2019</a:t>
+              <a:t>2/9/2019</a:t>
             </a:fld>
             <a:endParaRPr lang="en-US"/>
           </a:p>
@@ -1024,7 +1040,7 @@
             <a:fld id="{B6F15528-21DE-4FAA-801E-634DDDAF4B2B}" type="slidenum">
               <a:rPr lang="en-US" smtClean="0"/>
               <a:pPr/>
-              <a:t>‹#›</a:t>
+              <a:t>‹N°›</a:t>
             </a:fld>
             <a:endParaRPr lang="en-US"/>
           </a:p>
@@ -1148,7 +1164,7 @@
             <a:fld id="{1D8BD707-D9CF-40AE-B4C6-C98DA3205C09}" type="datetimeFigureOut">
               <a:rPr lang="en-US" smtClean="0"/>
               <a:pPr/>
-              <a:t>2/8/2019</a:t>
+              <a:t>2/9/2019</a:t>
             </a:fld>
             <a:endParaRPr lang="en-US"/>
           </a:p>
@@ -1191,7 +1207,7 @@
             <a:fld id="{B6F15528-21DE-4FAA-801E-634DDDAF4B2B}" type="slidenum">
               <a:rPr lang="en-US" smtClean="0"/>
               <a:pPr/>
-              <a:t>‹#›</a:t>
+              <a:t>‹N°›</a:t>
             </a:fld>
             <a:endParaRPr lang="en-US"/>
           </a:p>
@@ -1325,7 +1341,7 @@
             <a:fld id="{1D8BD707-D9CF-40AE-B4C6-C98DA3205C09}" type="datetimeFigureOut">
               <a:rPr lang="en-US" smtClean="0"/>
               <a:pPr/>
-              <a:t>2/8/2019</a:t>
+              <a:t>2/9/2019</a:t>
             </a:fld>
             <a:endParaRPr lang="en-US"/>
           </a:p>
@@ -1368,7 +1384,7 @@
             <a:fld id="{B6F15528-21DE-4FAA-801E-634DDDAF4B2B}" type="slidenum">
               <a:rPr lang="en-US" smtClean="0"/>
               <a:pPr/>
-              <a:t>‹#›</a:t>
+              <a:t>‹N°›</a:t>
             </a:fld>
             <a:endParaRPr lang="en-US"/>
           </a:p>
@@ -1492,7 +1508,7 @@
             <a:fld id="{1D8BD707-D9CF-40AE-B4C6-C98DA3205C09}" type="datetimeFigureOut">
               <a:rPr lang="en-US" smtClean="0"/>
               <a:pPr/>
-              <a:t>2/8/2019</a:t>
+              <a:t>2/9/2019</a:t>
             </a:fld>
             <a:endParaRPr lang="en-US"/>
           </a:p>
@@ -1535,7 +1551,7 @@
             <a:fld id="{B6F15528-21DE-4FAA-801E-634DDDAF4B2B}" type="slidenum">
               <a:rPr lang="en-US" smtClean="0"/>
               <a:pPr/>
-              <a:t>‹#›</a:t>
+              <a:t>‹N°›</a:t>
             </a:fld>
             <a:endParaRPr lang="en-US"/>
           </a:p>
@@ -1735,7 +1751,7 @@
             <a:fld id="{1D8BD707-D9CF-40AE-B4C6-C98DA3205C09}" type="datetimeFigureOut">
               <a:rPr lang="en-US" smtClean="0"/>
               <a:pPr/>
-              <a:t>2/8/2019</a:t>
+              <a:t>2/9/2019</a:t>
             </a:fld>
             <a:endParaRPr lang="en-US"/>
           </a:p>
@@ -1778,7 +1794,7 @@
             <a:fld id="{B6F15528-21DE-4FAA-801E-634DDDAF4B2B}" type="slidenum">
               <a:rPr lang="en-US" smtClean="0"/>
               <a:pPr/>
-              <a:t>‹#›</a:t>
+              <a:t>‹N°›</a:t>
             </a:fld>
             <a:endParaRPr lang="en-US"/>
           </a:p>
@@ -2020,7 +2036,7 @@
             <a:fld id="{1D8BD707-D9CF-40AE-B4C6-C98DA3205C09}" type="datetimeFigureOut">
               <a:rPr lang="en-US" smtClean="0"/>
               <a:pPr/>
-              <a:t>2/8/2019</a:t>
+              <a:t>2/9/2019</a:t>
             </a:fld>
             <a:endParaRPr lang="en-US"/>
           </a:p>
@@ -2063,7 +2079,7 @@
             <a:fld id="{B6F15528-21DE-4FAA-801E-634DDDAF4B2B}" type="slidenum">
               <a:rPr lang="en-US" smtClean="0"/>
               <a:pPr/>
-              <a:t>‹#›</a:t>
+              <a:t>‹N°›</a:t>
             </a:fld>
             <a:endParaRPr lang="en-US"/>
           </a:p>
@@ -2439,7 +2455,7 @@
             <a:fld id="{1D8BD707-D9CF-40AE-B4C6-C98DA3205C09}" type="datetimeFigureOut">
               <a:rPr lang="en-US" smtClean="0"/>
               <a:pPr/>
-              <a:t>2/8/2019</a:t>
+              <a:t>2/9/2019</a:t>
             </a:fld>
             <a:endParaRPr lang="en-US"/>
           </a:p>
@@ -2482,7 +2498,7 @@
             <a:fld id="{B6F15528-21DE-4FAA-801E-634DDDAF4B2B}" type="slidenum">
               <a:rPr lang="en-US" smtClean="0"/>
               <a:pPr/>
-              <a:t>‹#›</a:t>
+              <a:t>‹N°›</a:t>
             </a:fld>
             <a:endParaRPr lang="en-US"/>
           </a:p>
@@ -2554,7 +2570,7 @@
             <a:fld id="{1D8BD707-D9CF-40AE-B4C6-C98DA3205C09}" type="datetimeFigureOut">
               <a:rPr lang="en-US" smtClean="0"/>
               <a:pPr/>
-              <a:t>2/8/2019</a:t>
+              <a:t>2/9/2019</a:t>
             </a:fld>
             <a:endParaRPr lang="en-US"/>
           </a:p>
@@ -2597,7 +2613,7 @@
             <a:fld id="{B6F15528-21DE-4FAA-801E-634DDDAF4B2B}" type="slidenum">
               <a:rPr lang="en-US" smtClean="0"/>
               <a:pPr/>
-              <a:t>‹#›</a:t>
+              <a:t>‹N°›</a:t>
             </a:fld>
             <a:endParaRPr lang="en-US"/>
           </a:p>
@@ -2646,7 +2662,7 @@
             <a:fld id="{1D8BD707-D9CF-40AE-B4C6-C98DA3205C09}" type="datetimeFigureOut">
               <a:rPr lang="en-US" smtClean="0"/>
               <a:pPr/>
-              <a:t>2/8/2019</a:t>
+              <a:t>2/9/2019</a:t>
             </a:fld>
             <a:endParaRPr lang="en-US"/>
           </a:p>
@@ -2689,7 +2705,7 @@
             <a:fld id="{B6F15528-21DE-4FAA-801E-634DDDAF4B2B}" type="slidenum">
               <a:rPr lang="en-US" smtClean="0"/>
               <a:pPr/>
-              <a:t>‹#›</a:t>
+              <a:t>‹N°›</a:t>
             </a:fld>
             <a:endParaRPr lang="en-US"/>
           </a:p>
@@ -2920,7 +2936,7 @@
             <a:fld id="{1D8BD707-D9CF-40AE-B4C6-C98DA3205C09}" type="datetimeFigureOut">
               <a:rPr lang="en-US" smtClean="0"/>
               <a:pPr/>
-              <a:t>2/8/2019</a:t>
+              <a:t>2/9/2019</a:t>
             </a:fld>
             <a:endParaRPr lang="en-US"/>
           </a:p>
@@ -2963,7 +2979,7 @@
             <a:fld id="{B6F15528-21DE-4FAA-801E-634DDDAF4B2B}" type="slidenum">
               <a:rPr lang="en-US" smtClean="0"/>
               <a:pPr/>
-              <a:t>‹#›</a:t>
+              <a:t>‹N°›</a:t>
             </a:fld>
             <a:endParaRPr lang="en-US"/>
           </a:p>
@@ -3170,7 +3186,7 @@
             <a:fld id="{1D8BD707-D9CF-40AE-B4C6-C98DA3205C09}" type="datetimeFigureOut">
               <a:rPr lang="en-US" smtClean="0"/>
               <a:pPr/>
-              <a:t>2/8/2019</a:t>
+              <a:t>2/9/2019</a:t>
             </a:fld>
             <a:endParaRPr lang="en-US"/>
           </a:p>
@@ -3213,7 +3229,7 @@
             <a:fld id="{B6F15528-21DE-4FAA-801E-634DDDAF4B2B}" type="slidenum">
               <a:rPr lang="en-US" smtClean="0"/>
               <a:pPr/>
-              <a:t>‹#›</a:t>
+              <a:t>‹N°›</a:t>
             </a:fld>
             <a:endParaRPr lang="en-US"/>
           </a:p>
@@ -3380,7 +3396,7 @@
             <a:fld id="{1D8BD707-D9CF-40AE-B4C6-C98DA3205C09}" type="datetimeFigureOut">
               <a:rPr lang="en-US" smtClean="0"/>
               <a:pPr/>
-              <a:t>2/8/2019</a:t>
+              <a:t>2/9/2019</a:t>
             </a:fld>
             <a:endParaRPr lang="en-US"/>
           </a:p>
@@ -3459,7 +3475,7 @@
             <a:fld id="{B6F15528-21DE-4FAA-801E-634DDDAF4B2B}" type="slidenum">
               <a:rPr lang="en-US" smtClean="0"/>
               <a:pPr/>
-              <a:t>‹#›</a:t>
+              <a:t>‹N°›</a:t>
             </a:fld>
             <a:endParaRPr lang="en-US"/>
           </a:p>
@@ -3802,7 +3818,7 @@
             <p:spPr>
               <a:xfrm>
                 <a:off x="1447800" y="990600"/>
-                <a:ext cx="6240001" cy="4693334"/>
+                <a:ext cx="6240000" cy="4693334"/>
               </a:xfrm>
               <a:prstGeom prst="rect">
                 <a:avLst/>
@@ -3871,8 +3887,8 @@
             </p:nvSpPr>
             <p:spPr>
               <a:xfrm>
-                <a:off x="6925801" y="990599"/>
-                <a:ext cx="762000" cy="576263"/>
+                <a:off x="7260671" y="990599"/>
+                <a:ext cx="427129" cy="576263"/>
               </a:xfrm>
               <a:prstGeom prst="rect">
                 <a:avLst/>
@@ -4045,7 +4061,7 @@
           <p:spPr>
             <a:xfrm>
               <a:off x="1447801" y="990599"/>
-              <a:ext cx="5443537" cy="581025"/>
+              <a:ext cx="5783579" cy="581025"/>
             </a:xfrm>
             <a:prstGeom prst="rect">
               <a:avLst/>
@@ -4316,9 +4332,9 @@
           <p:grpSpPr>
             <a:xfrm>
               <a:off x="816880" y="990600"/>
-              <a:ext cx="6870921" cy="4693336"/>
+              <a:ext cx="6870920" cy="4693336"/>
               <a:chOff x="816880" y="990600"/>
-              <a:chExt cx="6870921" cy="4693336"/>
+              <a:chExt cx="6870920" cy="4693336"/>
             </a:xfrm>
           </p:grpSpPr>
           <p:pic>
@@ -4343,8 +4359,8 @@
             </p:blipFill>
             <p:spPr>
               <a:xfrm>
-                <a:off x="1447800" y="990600"/>
-                <a:ext cx="6240001" cy="4693333"/>
+                <a:off x="1447801" y="990600"/>
+                <a:ext cx="6239999" cy="4693333"/>
               </a:xfrm>
               <a:prstGeom prst="rect">
                 <a:avLst/>
@@ -4508,7 +4524,7 @@
           <p:spPr>
             <a:xfrm>
               <a:off x="1447801" y="990599"/>
-              <a:ext cx="5443537" cy="581025"/>
+              <a:ext cx="5791199" cy="581025"/>
             </a:xfrm>
             <a:prstGeom prst="rect">
               <a:avLst/>
@@ -4615,8 +4631,8 @@
           </p:nvSpPr>
           <p:spPr>
             <a:xfrm>
-              <a:off x="1447799" y="621269"/>
-              <a:ext cx="5443540" cy="369332"/>
+              <a:off x="1447798" y="621269"/>
+              <a:ext cx="5791201" cy="369332"/>
             </a:xfrm>
             <a:prstGeom prst="rect">
               <a:avLst/>
@@ -4765,9 +4781,9 @@
         <p:grpSpPr>
           <a:xfrm>
             <a:off x="1447800" y="990600"/>
-            <a:ext cx="6240000" cy="4693333"/>
+            <a:ext cx="6239999" cy="4693333"/>
             <a:chOff x="1447800" y="990600"/>
-            <a:chExt cx="6240000" cy="4693333"/>
+            <a:chExt cx="6239999" cy="4693333"/>
           </a:xfrm>
         </p:grpSpPr>
         <p:pic>
@@ -4793,7 +4809,7 @@
           <p:spPr>
             <a:xfrm>
               <a:off x="1447800" y="990600"/>
-              <a:ext cx="6240000" cy="4693333"/>
+              <a:ext cx="6239999" cy="4693333"/>
             </a:xfrm>
             <a:prstGeom prst="rect">
               <a:avLst/>
@@ -4808,7 +4824,7 @@
           </p:nvSpPr>
           <p:spPr>
             <a:xfrm>
-              <a:off x="2209800" y="2004645"/>
+              <a:off x="2209800" y="1907109"/>
               <a:ext cx="4681538" cy="413239"/>
             </a:xfrm>
             <a:prstGeom prst="rect">
@@ -4862,7 +4878,7 @@
           </p:nvSpPr>
           <p:spPr>
             <a:xfrm>
-              <a:off x="2209800" y="1632328"/>
+              <a:off x="2209800" y="1534792"/>
               <a:ext cx="4681538" cy="369332"/>
             </a:xfrm>
             <a:prstGeom prst="rect">
@@ -4952,10 +4968,10 @@
         </p:nvGrpSpPr>
         <p:grpSpPr>
           <a:xfrm>
-            <a:off x="1447800" y="990600"/>
-            <a:ext cx="7620000" cy="4693332"/>
-            <a:chOff x="1447800" y="990600"/>
-            <a:chExt cx="7620000" cy="4693332"/>
+            <a:off x="1447801" y="990600"/>
+            <a:ext cx="7619999" cy="4693332"/>
+            <a:chOff x="1447801" y="990600"/>
+            <a:chExt cx="7619999" cy="4693332"/>
           </a:xfrm>
         </p:grpSpPr>
         <p:pic>
@@ -4980,8 +4996,8 @@
           </p:blipFill>
           <p:spPr>
             <a:xfrm>
-              <a:off x="1447800" y="990600"/>
-              <a:ext cx="6240000" cy="4693332"/>
+              <a:off x="1447801" y="990600"/>
+              <a:ext cx="6239998" cy="4693332"/>
             </a:xfrm>
             <a:prstGeom prst="rect">
               <a:avLst/>
@@ -4996,7 +5012,7 @@
           </p:nvSpPr>
           <p:spPr>
             <a:xfrm>
-              <a:off x="5715000" y="1600200"/>
+              <a:off x="5715000" y="1504950"/>
               <a:ext cx="1972800" cy="457200"/>
             </a:xfrm>
             <a:prstGeom prst="rect">
@@ -5050,7 +5066,7 @@
           </p:nvSpPr>
           <p:spPr>
             <a:xfrm>
-              <a:off x="7687800" y="1632328"/>
+              <a:off x="7687800" y="1537078"/>
               <a:ext cx="1380000" cy="369332"/>
             </a:xfrm>
             <a:prstGeom prst="rect">

</xml_diff>